<commit_message>
Push benchmark data and pptx and images used for video.
</commit_message>
<xml_diff>
--- a/pipeline.pptx
+++ b/pipeline.pptx
@@ -7580,7 +7580,7 @@
           <a:p>
             <a:r>
               <a:rPr lang="fr-FR" dirty="0"/>
-              <a:t>25 millions of </a:t>
+              <a:t>24 millions of </a:t>
             </a:r>
             <a:r>
               <a:rPr lang="fr-FR" dirty="0" err="1"/>
@@ -7625,8 +7625,8 @@
         </p:blipFill>
         <p:spPr>
           <a:xfrm>
-            <a:off x="4102100" y="1825625"/>
-            <a:ext cx="3987799" cy="4351338"/>
+            <a:off x="4014418" y="1544432"/>
+            <a:ext cx="4440651" cy="4845473"/>
           </a:xfrm>
           <a:prstGeom prst="rect">
             <a:avLst/>
@@ -7728,7 +7728,7 @@
             <p:ph idx="1"/>
             <p:extLst>
               <p:ext uri="{D42A27DB-BD31-4B8C-83A1-F6EECF244321}">
-                <p14:modId xmlns:p14="http://schemas.microsoft.com/office/powerpoint/2010/main" val="370712796"/>
+                <p14:modId xmlns:p14="http://schemas.microsoft.com/office/powerpoint/2010/main" val="527597232"/>
               </p:ext>
             </p:extLst>
           </p:nvPr>
@@ -7779,6 +7779,7 @@
                     <a:bodyPr/>
                     <a:lstStyle/>
                     <a:p>
+                      <a:pPr algn="ctr"/>
                       <a:r>
                         <a:rPr lang="fr-FR" dirty="0"/>
                         <a:t>Model</a:t>
@@ -7792,6 +7793,7 @@
                     <a:bodyPr/>
                     <a:lstStyle/>
                     <a:p>
+                      <a:pPr algn="ctr"/>
                       <a:r>
                         <a:rPr lang="fr-FR" dirty="0" err="1"/>
                         <a:t>Overall</a:t>
@@ -7806,6 +7808,7 @@
                     <a:bodyPr/>
                     <a:lstStyle/>
                     <a:p>
+                      <a:pPr algn="ctr"/>
                       <a:r>
                         <a:rPr lang="fr-FR" dirty="0"/>
                         <a:t>Tone</a:t>
@@ -7819,6 +7822,7 @@
                     <a:bodyPr/>
                     <a:lstStyle/>
                     <a:p>
+                      <a:pPr algn="ctr"/>
                       <a:r>
                         <a:rPr lang="fr-FR" dirty="0"/>
                         <a:t>Structure &amp; Content</a:t>
@@ -7852,6 +7856,7 @@
                     <a:bodyPr/>
                     <a:lstStyle/>
                     <a:p>
+                      <a:pPr algn="ctr"/>
                       <a:r>
                         <a:rPr lang="fr-FR" dirty="0"/>
                         <a:t>6.26024</a:t>
@@ -7865,6 +7870,7 @@
                     <a:bodyPr/>
                     <a:lstStyle/>
                     <a:p>
+                      <a:pPr algn="ctr"/>
                       <a:r>
                         <a:rPr lang="fr-FR" dirty="0"/>
                         <a:t>7.19397</a:t>
@@ -7878,6 +7884,7 @@
                     <a:bodyPr/>
                     <a:lstStyle/>
                     <a:p>
+                      <a:pPr algn="ctr"/>
                       <a:r>
                         <a:rPr lang="fr-FR" dirty="0"/>
                         <a:t>5.33728</a:t>
@@ -7916,6 +7923,7 @@
                     <a:bodyPr/>
                     <a:lstStyle/>
                     <a:p>
+                      <a:pPr algn="ctr"/>
                       <a:r>
                         <a:rPr lang="fr-FR" dirty="0"/>
                         <a:t>6.51767</a:t>
@@ -7929,6 +7937,7 @@
                     <a:bodyPr/>
                     <a:lstStyle/>
                     <a:p>
+                      <a:pPr algn="ctr"/>
                       <a:r>
                         <a:rPr lang="fr-FR" dirty="0"/>
                         <a:t>7.33264</a:t>
@@ -7942,6 +7951,7 @@
                     <a:bodyPr/>
                     <a:lstStyle/>
                     <a:p>
+                      <a:pPr algn="ctr"/>
                       <a:r>
                         <a:rPr lang="fr-FR" dirty="0"/>
                         <a:t>5.73493</a:t>
@@ -7968,7 +7978,7 @@
                       </a:r>
                       <a:r>
                         <a:rPr lang="fr-FR" dirty="0" err="1"/>
-                        <a:t>latest</a:t>
+                        <a:t>Latest</a:t>
                       </a:r>
                       <a:endParaRPr lang="fr-FR" dirty="0"/>
                     </a:p>
@@ -7980,6 +7990,7 @@
                     <a:bodyPr/>
                     <a:lstStyle/>
                     <a:p>
+                      <a:pPr algn="ctr"/>
                       <a:r>
                         <a:rPr lang="fr-FR" dirty="0"/>
                         <a:t>6.64936</a:t>
@@ -7993,6 +8004,7 @@
                     <a:bodyPr/>
                     <a:lstStyle/>
                     <a:p>
+                      <a:pPr algn="ctr"/>
                       <a:r>
                         <a:rPr lang="fr-FR" dirty="0"/>
                         <a:t>7.44861</a:t>
@@ -8006,6 +8018,7 @@
                     <a:bodyPr/>
                     <a:lstStyle/>
                     <a:p>
+                      <a:pPr algn="ctr"/>
                       <a:r>
                         <a:rPr lang="fr-FR" dirty="0"/>
                         <a:t>5.86296</a:t>
@@ -8044,6 +8057,7 @@
                     <a:bodyPr/>
                     <a:lstStyle/>
                     <a:p>
+                      <a:pPr algn="ctr"/>
                       <a:r>
                         <a:rPr lang="fr-FR" dirty="0"/>
                         <a:t>6.92848</a:t>
@@ -8057,6 +8071,7 @@
                     <a:bodyPr/>
                     <a:lstStyle/>
                     <a:p>
+                      <a:pPr algn="ctr"/>
                       <a:r>
                         <a:rPr lang="fr-FR" dirty="0"/>
                         <a:t>7.68582</a:t>
@@ -8070,6 +8085,7 @@
                     <a:bodyPr/>
                     <a:lstStyle/>
                     <a:p>
+                      <a:pPr algn="ctr"/>
                       <a:r>
                         <a:rPr lang="fr-FR" dirty="0"/>
                         <a:t>6.23627</a:t>
@@ -8102,7 +8118,7 @@
         </p:nvSpPr>
         <p:spPr>
           <a:xfrm>
-            <a:off x="838200" y="4158640"/>
+            <a:off x="838200" y="4321478"/>
             <a:ext cx="10515600" cy="2031325"/>
           </a:xfrm>
           <a:prstGeom prst="rect">
@@ -8154,7 +8170,7 @@
             </a:r>
             <a:r>
               <a:rPr lang="fr-FR" dirty="0"/>
-              <a:t> on a set of directives on style, structure and content.</a:t>
+              <a:t> on a set of directives for style, structure and content.</a:t>
             </a:r>
           </a:p>
           <a:p>
@@ -8247,7 +8263,7 @@
             </a:pPr>
             <a:r>
               <a:rPr lang="fr-FR" dirty="0"/>
-              <a:t>Script </a:t>
+              <a:t>Original Script </a:t>
             </a:r>
             <a:r>
               <a:rPr lang="fr-FR" dirty="0" err="1"/>

</xml_diff>